<commit_message>
slides pptx et pdf
</commit_message>
<xml_diff>
--- a/slides/alcolobattle.pptx
+++ b/slides/alcolobattle.pptx
@@ -6203,10 +6203,6 @@
               </a:rPr>
               <a:t>Caroline Beyne  </a:t>
             </a:r>
-            <a:endParaRPr lang="en-US" sz="1600" dirty="0" smtClean="0">
-              <a:latin typeface="+mj-lt"/>
-              <a:cs typeface="Times New Roman" pitchFamily="18" charset="0"/>
-            </a:endParaRPr>
           </a:p>
           <a:p>
             <a:pPr algn="r"/>
@@ -6263,11 +6259,7 @@
             <a:pPr algn="ctr"/>
             <a:r>
               <a:rPr lang="en-US" sz="4800" dirty="0" smtClean="0"/>
-              <a:t>MASA </a:t>
-            </a:r>
-            <a:r>
-              <a:rPr lang="en-US" sz="4800" dirty="0" smtClean="0"/>
-              <a:t>LIFE</a:t>
+              <a:t>MASA LIFE</a:t>
             </a:r>
             <a:endParaRPr lang="en-US" sz="4800" dirty="0"/>
           </a:p>
@@ -6331,27 +6323,6 @@
               <a:t>Mise en </a:t>
             </a:r>
             <a:r>
-              <a:rPr lang="fr-FR" dirty="0" err="1" smtClean="0">
-                <a:ln w="18415" cmpd="sng">
-                  <a:solidFill>
-                    <a:srgbClr val="FFFFFF"/>
-                  </a:solidFill>
-                  <a:prstDash val="solid"/>
-                </a:ln>
-                <a:solidFill>
-                  <a:srgbClr val="FFFFFF"/>
-                </a:solidFill>
-                <a:effectLst>
-                  <a:outerShdw blurRad="63500" dir="3600000" algn="tl" rotWithShape="0">
-                    <a:srgbClr val="000000">
-                      <a:alpha val="70000"/>
-                    </a:srgbClr>
-                  </a:outerShdw>
-                </a:effectLst>
-              </a:rPr>
-              <a:t>oeuvre</a:t>
-            </a:r>
-            <a:r>
               <a:rPr lang="fr-FR" dirty="0" smtClean="0">
                 <a:ln w="18415" cmpd="sng">
                   <a:solidFill>
@@ -6370,7 +6341,7 @@
                   </a:outerShdw>
                 </a:effectLst>
               </a:rPr>
-              <a:t> </a:t>
+              <a:t>œuvre </a:t>
             </a:r>
             <a:r>
               <a:rPr lang="fr-FR" dirty="0" smtClean="0">
@@ -6391,28 +6362,7 @@
                   </a:outerShdw>
                 </a:effectLst>
               </a:rPr>
-              <a:t>pratique de Système </a:t>
-            </a:r>
-            <a:r>
-              <a:rPr lang="fr-FR" dirty="0" smtClean="0">
-                <a:ln w="18415" cmpd="sng">
-                  <a:solidFill>
-                    <a:srgbClr val="FFFFFF"/>
-                  </a:solidFill>
-                  <a:prstDash val="solid"/>
-                </a:ln>
-                <a:solidFill>
-                  <a:srgbClr val="FFFFFF"/>
-                </a:solidFill>
-                <a:effectLst>
-                  <a:outerShdw blurRad="63500" dir="3600000" algn="tl" rotWithShape="0">
-                    <a:srgbClr val="000000">
-                      <a:alpha val="70000"/>
-                    </a:srgbClr>
-                  </a:outerShdw>
-                </a:effectLst>
-              </a:rPr>
-              <a:t>Multi-Agents</a:t>
+              <a:t>pratique de Système Multi-Agents</a:t>
             </a:r>
             <a:endParaRPr lang="fr-FR" dirty="0"/>
           </a:p>
@@ -6763,7 +6713,7 @@
     </p:spTree>
     <p:extLst>
       <p:ext uri="{BB962C8B-B14F-4D97-AF65-F5344CB8AC3E}">
-        <p14:creationId xmlns:p14="http://schemas.microsoft.com/office/powerpoint/2010/main" xmlns="" val="434478724"/>
+        <p14:creationId xmlns="" xmlns:p14="http://schemas.microsoft.com/office/powerpoint/2010/main" val="434478724"/>
       </p:ext>
     </p:extLst>
   </p:cSld>
@@ -7016,15 +6966,7 @@
           <a:p>
             <a:r>
               <a:rPr lang="en-US" dirty="0" smtClean="0"/>
-              <a:t>Un </a:t>
-            </a:r>
-            <a:r>
-              <a:rPr lang="en-US" dirty="0" smtClean="0"/>
-              <a:t>“knowledge” </a:t>
-            </a:r>
-            <a:r>
-              <a:rPr lang="en-US" dirty="0" smtClean="0"/>
-              <a:t>par prototype + un global</a:t>
+              <a:t>Un “knowledge” par prototype + un global</a:t>
             </a:r>
           </a:p>
           <a:p>
@@ -7037,11 +6979,7 @@
             <a:pPr lvl="1"/>
             <a:r>
               <a:rPr lang="en-US" dirty="0" smtClean="0"/>
-              <a:t>2 </a:t>
-            </a:r>
-            <a:r>
-              <a:rPr lang="en-US" dirty="0" smtClean="0"/>
-              <a:t>agents de </a:t>
+              <a:t>2 agents de </a:t>
             </a:r>
             <a:r>
               <a:rPr lang="en-US" dirty="0" err="1" smtClean="0"/>
@@ -7228,7 +7166,7 @@
     </p:spTree>
     <p:extLst>
       <p:ext uri="{BB962C8B-B14F-4D97-AF65-F5344CB8AC3E}">
-        <p14:creationId xmlns:p14="http://schemas.microsoft.com/office/powerpoint/2010/main" xmlns="" val="399245354"/>
+        <p14:creationId xmlns="" xmlns:p14="http://schemas.microsoft.com/office/powerpoint/2010/main" val="399245354"/>
       </p:ext>
     </p:extLst>
   </p:cSld>
@@ -7355,7 +7293,6 @@
               <a:rPr lang="en-US" dirty="0" smtClean="0"/>
               <a:t>)</a:t>
             </a:r>
-            <a:endParaRPr lang="en-US" dirty="0" smtClean="0"/>
           </a:p>
           <a:p>
             <a:pPr lvl="1"/>
@@ -7365,13 +7302,8 @@
             </a:r>
             <a:r>
               <a:rPr lang="en-US" dirty="0" smtClean="0"/>
-              <a:t> </a:t>
-            </a:r>
-            <a:r>
-              <a:rPr lang="en-US" dirty="0" smtClean="0"/>
-              <a:t>scène avec un DJ</a:t>
-            </a:r>
-            <a:endParaRPr lang="en-US" dirty="0" smtClean="0"/>
+              <a:t> scène avec un DJ</a:t>
+            </a:r>
           </a:p>
           <a:p>
             <a:pPr lvl="1"/>
@@ -7381,11 +7313,7 @@
             </a:r>
             <a:r>
               <a:rPr lang="en-US" dirty="0" smtClean="0"/>
-              <a:t> </a:t>
-            </a:r>
-            <a:r>
-              <a:rPr lang="en-US" dirty="0" smtClean="0"/>
-              <a:t>tables</a:t>
+              <a:t> tables</a:t>
             </a:r>
           </a:p>
         </p:txBody>
@@ -7393,7 +7321,7 @@
     </p:spTree>
     <p:extLst>
       <p:ext uri="{BB962C8B-B14F-4D97-AF65-F5344CB8AC3E}">
-        <p14:creationId xmlns:p14="http://schemas.microsoft.com/office/powerpoint/2010/main" xmlns="" val="2135946275"/>
+        <p14:creationId xmlns="" xmlns:p14="http://schemas.microsoft.com/office/powerpoint/2010/main" val="2135946275"/>
       </p:ext>
     </p:extLst>
   </p:cSld>
@@ -8224,7 +8152,7 @@
     </p:spTree>
     <p:extLst>
       <p:ext uri="{BB962C8B-B14F-4D97-AF65-F5344CB8AC3E}">
-        <p14:creationId xmlns:p14="http://schemas.microsoft.com/office/powerpoint/2010/main" xmlns="" val="4111077975"/>
+        <p14:creationId xmlns="" xmlns:p14="http://schemas.microsoft.com/office/powerpoint/2010/main" val="4111077975"/>
       </p:ext>
     </p:extLst>
   </p:cSld>
@@ -8299,90 +8227,73 @@
           <a:lstStyle/>
           <a:p>
             <a:r>
+              <a:rPr lang="fr-FR" dirty="0" smtClean="0"/>
+              <a:t>Pas de client</a:t>
+            </a:r>
+          </a:p>
+          <a:p>
+            <a:pPr lvl="1"/>
+            <a:r>
+              <a:rPr lang="fr-FR" dirty="0" smtClean="0"/>
+              <a:t>Attend</a:t>
+            </a:r>
+          </a:p>
+          <a:p>
+            <a:r>
+              <a:rPr lang="fr-FR" dirty="0" smtClean="0"/>
+              <a:t>Client</a:t>
+            </a:r>
+          </a:p>
+          <a:p>
+            <a:pPr lvl="1"/>
+            <a:r>
+              <a:rPr lang="fr-FR" dirty="0" smtClean="0"/>
+              <a:t>Prend la commande</a:t>
+            </a:r>
+          </a:p>
+          <a:p>
+            <a:pPr lvl="1"/>
+            <a:r>
+              <a:rPr lang="fr-FR" dirty="0" smtClean="0"/>
+              <a:t>Sert à boire</a:t>
+            </a:r>
+          </a:p>
+          <a:p>
+            <a:pPr lvl="1"/>
+            <a:r>
               <a:rPr lang="fr-FR" smtClean="0"/>
-              <a:t>Pas de client</a:t>
-            </a:r>
+              <a:t>Parle</a:t>
+            </a:r>
+            <a:endParaRPr lang="fr-FR" smtClean="0"/>
           </a:p>
           <a:p>
             <a:pPr lvl="1"/>
-            <a:r>
-              <a:rPr lang="fr-FR" smtClean="0"/>
-              <a:t>Attend</a:t>
-            </a:r>
-            <a:endParaRPr lang="fr-FR" smtClean="0"/>
-          </a:p>
-          <a:p>
-            <a:r>
-              <a:rPr lang="fr-FR" smtClean="0"/>
-              <a:t>Client</a:t>
-            </a:r>
-            <a:endParaRPr lang="fr-FR" smtClean="0"/>
-          </a:p>
-          <a:p>
-            <a:pPr lvl="1"/>
-            <a:r>
-              <a:rPr lang="fr-FR" smtClean="0"/>
-              <a:t>Prend la </a:t>
-            </a:r>
-            <a:r>
-              <a:rPr lang="fr-FR" smtClean="0"/>
-              <a:t>commande</a:t>
-            </a:r>
-            <a:endParaRPr lang="fr-FR" smtClean="0"/>
-          </a:p>
-          <a:p>
-            <a:pPr lvl="1"/>
-            <a:r>
-              <a:rPr lang="fr-FR" smtClean="0"/>
-              <a:t>Sert à </a:t>
-            </a:r>
-            <a:r>
-              <a:rPr lang="fr-FR" smtClean="0"/>
-              <a:t>boire</a:t>
-            </a:r>
-            <a:endParaRPr lang="fr-FR" smtClean="0"/>
-          </a:p>
-          <a:p>
-            <a:pPr lvl="1"/>
-            <a:r>
-              <a:rPr lang="fr-FR" smtClean="0"/>
-              <a:t>Parler</a:t>
-            </a:r>
-            <a:endParaRPr lang="fr-FR" smtClean="0"/>
-          </a:p>
-          <a:p>
-            <a:pPr lvl="1"/>
-            <a:endParaRPr lang="fr-FR" smtClean="0"/>
+            <a:endParaRPr lang="fr-FR" dirty="0" smtClean="0"/>
           </a:p>
           <a:p>
             <a:pPr marL="0" indent="0">
               <a:buNone/>
             </a:pPr>
             <a:r>
-              <a:rPr lang="fr-FR" smtClean="0"/>
-              <a:t>Interactions uniquement avec les </a:t>
-            </a:r>
-            <a:r>
-              <a:rPr lang="fr-FR" smtClean="0"/>
-              <a:t>clients.</a:t>
-            </a:r>
-            <a:endParaRPr lang="fr-FR" smtClean="0"/>
+              <a:rPr lang="fr-FR" dirty="0" smtClean="0"/>
+              <a:t>Interactions uniquement avec les clients.</a:t>
+            </a:r>
           </a:p>
           <a:p>
             <a:pPr marL="0" indent="0">
               <a:buNone/>
             </a:pPr>
             <a:r>
-              <a:rPr lang="fr-FR" smtClean="0"/>
+              <a:rPr lang="fr-FR" dirty="0" smtClean="0"/>
               <a:t>Et bien évidemment les barmans ne boivent pas </a:t>
             </a:r>
             <a:r>
-              <a:rPr lang="fr-FR" smtClean="0">
+              <a:rPr lang="fr-FR" dirty="0" smtClean="0">
                 <a:sym typeface="Wingdings" pitchFamily="2" charset="2"/>
               </a:rPr>
               <a:t></a:t>
             </a:r>
-            <a:endParaRPr lang="fr-FR"/>
+            <a:endParaRPr lang="fr-FR" dirty="0"/>
           </a:p>
         </p:txBody>
       </p:sp>
@@ -8413,7 +8324,7 @@
     </p:spTree>
     <p:extLst>
       <p:ext uri="{BB962C8B-B14F-4D97-AF65-F5344CB8AC3E}">
-        <p14:creationId xmlns:p14="http://schemas.microsoft.com/office/powerpoint/2010/main" xmlns="" val="3191071618"/>
+        <p14:creationId xmlns="" xmlns:p14="http://schemas.microsoft.com/office/powerpoint/2010/main" val="3191071618"/>
       </p:ext>
     </p:extLst>
   </p:cSld>
@@ -8651,7 +8562,7 @@
     </p:spTree>
     <p:extLst>
       <p:ext uri="{BB962C8B-B14F-4D97-AF65-F5344CB8AC3E}">
-        <p14:creationId xmlns:p14="http://schemas.microsoft.com/office/powerpoint/2010/main" xmlns="" val="2258638608"/>
+        <p14:creationId xmlns="" xmlns:p14="http://schemas.microsoft.com/office/powerpoint/2010/main" val="2258638608"/>
       </p:ext>
     </p:extLst>
   </p:cSld>
@@ -8867,7 +8778,7 @@
     </p:spTree>
     <p:extLst>
       <p:ext uri="{BB962C8B-B14F-4D97-AF65-F5344CB8AC3E}">
-        <p14:creationId xmlns:p14="http://schemas.microsoft.com/office/powerpoint/2010/main" xmlns="" val="933529545"/>
+        <p14:creationId xmlns="" xmlns:p14="http://schemas.microsoft.com/office/powerpoint/2010/main" val="933529545"/>
       </p:ext>
     </p:extLst>
   </p:cSld>

</xml_diff>